<commit_message>
add a paper to implement
</commit_message>
<xml_diff>
--- a/maning/遗传算法.pptx
+++ b/maning/遗传算法.pptx
@@ -3140,7 +3140,7 @@
                 <a:spcPct val="100000"/>
               </a:lnSpc>
             </a:pPr>
-            <a:fld id="{F670194A-3B09-44F6-85AE-01152F3FFFE1}" type="slidenum">
+            <a:fld id="{BDE8A600-5EC9-422B-9F8A-00553CAA8677}" type="slidenum">
               <a:rPr b="0" lang="en-US" sz="1200" spc="-1" strike="noStrike">
                 <a:solidFill>
                   <a:srgbClr val="8b8b8b"/>
@@ -4071,7 +4071,7 @@
                 <a:spcPct val="100000"/>
               </a:lnSpc>
             </a:pPr>
-            <a:fld id="{22AC4B5D-9272-44FC-8769-C42746B3A3F4}" type="slidenum">
+            <a:fld id="{20D887BD-A738-4F12-B64B-6F1D9FEE220C}" type="slidenum">
               <a:rPr b="0" lang="en-US" sz="1200" spc="-1" strike="noStrike">
                 <a:solidFill>
                   <a:srgbClr val="8b8b8b"/>

</xml_diff>